<commit_message>
Added Tap node data logic.  Edited stylesheet
</commit_message>
<xml_diff>
--- a/GGTopologyViewer/static/GGtopologyicons.pptx
+++ b/GGTopologyViewer/static/GGtopologyicons.pptx
@@ -265,7 +265,7 @@
           <a:p>
             <a:fld id="{28CB38FD-5271-4ED9-8B3B-6EBCF4CAD40E}" type="datetimeFigureOut">
               <a:rPr lang="en-SG" smtClean="0"/>
-              <a:t>13/2/2024</a:t>
+              <a:t>15/2/2024</a:t>
             </a:fld>
             <a:endParaRPr lang="en-SG"/>
           </a:p>
@@ -465,7 +465,7 @@
           <a:p>
             <a:fld id="{28CB38FD-5271-4ED9-8B3B-6EBCF4CAD40E}" type="datetimeFigureOut">
               <a:rPr lang="en-SG" smtClean="0"/>
-              <a:t>13/2/2024</a:t>
+              <a:t>15/2/2024</a:t>
             </a:fld>
             <a:endParaRPr lang="en-SG"/>
           </a:p>
@@ -675,7 +675,7 @@
           <a:p>
             <a:fld id="{28CB38FD-5271-4ED9-8B3B-6EBCF4CAD40E}" type="datetimeFigureOut">
               <a:rPr lang="en-SG" smtClean="0"/>
-              <a:t>13/2/2024</a:t>
+              <a:t>15/2/2024</a:t>
             </a:fld>
             <a:endParaRPr lang="en-SG"/>
           </a:p>
@@ -875,7 +875,7 @@
           <a:p>
             <a:fld id="{28CB38FD-5271-4ED9-8B3B-6EBCF4CAD40E}" type="datetimeFigureOut">
               <a:rPr lang="en-SG" smtClean="0"/>
-              <a:t>13/2/2024</a:t>
+              <a:t>15/2/2024</a:t>
             </a:fld>
             <a:endParaRPr lang="en-SG"/>
           </a:p>
@@ -1151,7 +1151,7 @@
           <a:p>
             <a:fld id="{28CB38FD-5271-4ED9-8B3B-6EBCF4CAD40E}" type="datetimeFigureOut">
               <a:rPr lang="en-SG" smtClean="0"/>
-              <a:t>13/2/2024</a:t>
+              <a:t>15/2/2024</a:t>
             </a:fld>
             <a:endParaRPr lang="en-SG"/>
           </a:p>
@@ -1419,7 +1419,7 @@
           <a:p>
             <a:fld id="{28CB38FD-5271-4ED9-8B3B-6EBCF4CAD40E}" type="datetimeFigureOut">
               <a:rPr lang="en-SG" smtClean="0"/>
-              <a:t>13/2/2024</a:t>
+              <a:t>15/2/2024</a:t>
             </a:fld>
             <a:endParaRPr lang="en-SG"/>
           </a:p>
@@ -1834,7 +1834,7 @@
           <a:p>
             <a:fld id="{28CB38FD-5271-4ED9-8B3B-6EBCF4CAD40E}" type="datetimeFigureOut">
               <a:rPr lang="en-SG" smtClean="0"/>
-              <a:t>13/2/2024</a:t>
+              <a:t>15/2/2024</a:t>
             </a:fld>
             <a:endParaRPr lang="en-SG"/>
           </a:p>
@@ -1976,7 +1976,7 @@
           <a:p>
             <a:fld id="{28CB38FD-5271-4ED9-8B3B-6EBCF4CAD40E}" type="datetimeFigureOut">
               <a:rPr lang="en-SG" smtClean="0"/>
-              <a:t>13/2/2024</a:t>
+              <a:t>15/2/2024</a:t>
             </a:fld>
             <a:endParaRPr lang="en-SG"/>
           </a:p>
@@ -2089,7 +2089,7 @@
           <a:p>
             <a:fld id="{28CB38FD-5271-4ED9-8B3B-6EBCF4CAD40E}" type="datetimeFigureOut">
               <a:rPr lang="en-SG" smtClean="0"/>
-              <a:t>13/2/2024</a:t>
+              <a:t>15/2/2024</a:t>
             </a:fld>
             <a:endParaRPr lang="en-SG"/>
           </a:p>
@@ -2402,7 +2402,7 @@
           <a:p>
             <a:fld id="{28CB38FD-5271-4ED9-8B3B-6EBCF4CAD40E}" type="datetimeFigureOut">
               <a:rPr lang="en-SG" smtClean="0"/>
-              <a:t>13/2/2024</a:t>
+              <a:t>15/2/2024</a:t>
             </a:fld>
             <a:endParaRPr lang="en-SG"/>
           </a:p>
@@ -2691,7 +2691,7 @@
           <a:p>
             <a:fld id="{28CB38FD-5271-4ED9-8B3B-6EBCF4CAD40E}" type="datetimeFigureOut">
               <a:rPr lang="en-SG" smtClean="0"/>
-              <a:t>13/2/2024</a:t>
+              <a:t>15/2/2024</a:t>
             </a:fld>
             <a:endParaRPr lang="en-SG"/>
           </a:p>
@@ -2934,7 +2934,7 @@
           <a:p>
             <a:fld id="{28CB38FD-5271-4ED9-8B3B-6EBCF4CAD40E}" type="datetimeFigureOut">
               <a:rPr lang="en-SG" smtClean="0"/>
-              <a:t>13/2/2024</a:t>
+              <a:t>15/2/2024</a:t>
             </a:fld>
             <a:endParaRPr lang="en-SG"/>
           </a:p>
@@ -3366,10 +3366,15 @@
         <p:grpSpPr>
           <a:xfrm>
             <a:off x="2224454" y="826476"/>
-            <a:ext cx="2778370" cy="1349555"/>
+            <a:ext cx="2778370" cy="1318847"/>
             <a:chOff x="2224454" y="826476"/>
-            <a:chExt cx="2778370" cy="1349555"/>
+            <a:chExt cx="2778370" cy="1318847"/>
           </a:xfrm>
+          <a:solidFill>
+            <a:schemeClr val="bg1">
+              <a:lumMod val="85000"/>
+            </a:schemeClr>
+          </a:solidFill>
         </p:grpSpPr>
         <p:sp>
           <p:nvSpPr>
@@ -3391,6 +3396,10 @@
             <a:prstGeom prst="ellipse">
               <a:avLst/>
             </a:prstGeom>
+            <a:grpFill/>
+            <a:ln>
+              <a:noFill/>
+            </a:ln>
           </p:spPr>
           <p:style>
             <a:lnRef idx="2">
@@ -3470,13 +3479,16 @@
           </p:nvSpPr>
           <p:spPr>
             <a:xfrm>
-              <a:off x="3103686" y="1899032"/>
+              <a:off x="3099289" y="1824257"/>
               <a:ext cx="1028700" cy="276999"/>
             </a:xfrm>
             <a:prstGeom prst="rect">
               <a:avLst/>
             </a:prstGeom>
-            <a:noFill/>
+            <a:grpFill/>
+            <a:ln>
+              <a:noFill/>
+            </a:ln>
           </p:spPr>
           <p:txBody>
             <a:bodyPr wrap="square" rtlCol="0">
@@ -3525,10 +3537,10 @@
       </p:grpSpPr>
       <p:grpSp>
         <p:nvGrpSpPr>
-          <p:cNvPr id="8" name="Group 7">
-            <a:extLst>
-              <a:ext uri="{FF2B5EF4-FFF2-40B4-BE49-F238E27FC236}">
-                <a16:creationId xmlns:a16="http://schemas.microsoft.com/office/drawing/2014/main" id="{8E776387-2003-D5D7-A9D4-993A9DA652D0}"/>
+          <p:cNvPr id="13" name="Group 12">
+            <a:extLst>
+              <a:ext uri="{FF2B5EF4-FFF2-40B4-BE49-F238E27FC236}">
+                <a16:creationId xmlns:a16="http://schemas.microsoft.com/office/drawing/2014/main" id="{62711330-2E79-AD57-2C81-112A88B25F16}"/>
               </a:ext>
             </a:extLst>
           </p:cNvPr>
@@ -3537,10 +3549,10 @@
         </p:nvGrpSpPr>
         <p:grpSpPr>
           <a:xfrm>
-            <a:off x="2470638" y="1125414"/>
-            <a:ext cx="2778370" cy="1349555"/>
-            <a:chOff x="2224454" y="826476"/>
-            <a:chExt cx="2778370" cy="1349555"/>
+            <a:off x="2546052" y="1110059"/>
+            <a:ext cx="2778370" cy="1318847"/>
+            <a:chOff x="2546052" y="1110059"/>
+            <a:chExt cx="2778370" cy="1318847"/>
           </a:xfrm>
         </p:grpSpPr>
         <p:sp>
@@ -3557,15 +3569,20 @@
           </p:nvSpPr>
           <p:spPr>
             <a:xfrm>
-              <a:off x="2224454" y="826476"/>
+              <a:off x="2546052" y="1110059"/>
               <a:ext cx="2778370" cy="1318847"/>
             </a:xfrm>
             <a:prstGeom prst="ellipse">
               <a:avLst/>
             </a:prstGeom>
             <a:solidFill>
-              <a:srgbClr val="FF0000"/>
+              <a:srgbClr val="231F26">
+                <a:alpha val="67000"/>
+              </a:srgbClr>
             </a:solidFill>
+            <a:ln>
+              <a:noFill/>
+            </a:ln>
           </p:spPr>
           <p:style>
             <a:lnRef idx="2">
@@ -3623,7 +3640,7 @@
           </p:blipFill>
           <p:spPr>
             <a:xfrm>
-              <a:off x="3200506" y="1055182"/>
+              <a:off x="3139665" y="1194040"/>
               <a:ext cx="826266" cy="826266"/>
             </a:xfrm>
             <a:prstGeom prst="rect">
@@ -3645,13 +3662,16 @@
           </p:nvSpPr>
           <p:spPr>
             <a:xfrm>
-              <a:off x="3103686" y="1899032"/>
+              <a:off x="3071359" y="1965787"/>
               <a:ext cx="1028700" cy="276999"/>
             </a:xfrm>
             <a:prstGeom prst="rect">
               <a:avLst/>
             </a:prstGeom>
             <a:noFill/>
+            <a:ln>
+              <a:noFill/>
+            </a:ln>
           </p:spPr>
           <p:txBody>
             <a:bodyPr wrap="square" rtlCol="0">
@@ -3663,6 +3683,164 @@
               <a:r>
                 <a:rPr lang="en-SG" sz="1200" b="1" dirty="0" err="1"/>
                 <a:t>NoExtract</a:t>
+              </a:r>
+              <a:endParaRPr lang="en-SG" sz="1100" b="1" dirty="0"/>
+            </a:p>
+          </p:txBody>
+        </p:sp>
+        <p:pic>
+          <p:nvPicPr>
+            <p:cNvPr id="3" name="Graphic 2" descr="Satellite dish outline">
+              <a:extLst>
+                <a:ext uri="{FF2B5EF4-FFF2-40B4-BE49-F238E27FC236}">
+                  <a16:creationId xmlns:a16="http://schemas.microsoft.com/office/drawing/2014/main" id="{A9422AC3-9DFE-4CEF-CAE9-CDAA6D2F3552}"/>
+                </a:ext>
+              </a:extLst>
+            </p:cNvPr>
+            <p:cNvPicPr>
+              <a:picLocks noChangeAspect="1"/>
+            </p:cNvPicPr>
+            <p:nvPr/>
+          </p:nvPicPr>
+          <p:blipFill>
+            <a:blip r:embed="rId4">
+              <a:extLst>
+                <a:ext uri="{28A0092B-C50C-407E-A947-70E740481C1C}">
+                  <a14:useLocalDpi xmlns:a14="http://schemas.microsoft.com/office/drawing/2010/main" val="0"/>
+                </a:ext>
+                <a:ext uri="{96DAC541-7B7A-43D3-8B79-37D633B846F1}">
+                  <asvg:svgBlip xmlns:asvg="http://schemas.microsoft.com/office/drawing/2016/SVG/main" r:embed="rId5"/>
+                </a:ext>
+              </a:extLst>
+            </a:blip>
+            <a:stretch>
+              <a:fillRect/>
+            </a:stretch>
+          </p:blipFill>
+          <p:spPr>
+            <a:xfrm>
+              <a:off x="4058194" y="1199565"/>
+              <a:ext cx="802800" cy="802800"/>
+            </a:xfrm>
+            <a:prstGeom prst="rect">
+              <a:avLst/>
+            </a:prstGeom>
+          </p:spPr>
+        </p:pic>
+        <p:sp>
+          <p:nvSpPr>
+            <p:cNvPr id="5" name="TextBox 4">
+              <a:extLst>
+                <a:ext uri="{FF2B5EF4-FFF2-40B4-BE49-F238E27FC236}">
+                  <a16:creationId xmlns:a16="http://schemas.microsoft.com/office/drawing/2014/main" id="{5567CC92-0688-8E00-80A3-B940D307AE47}"/>
+                </a:ext>
+              </a:extLst>
+            </p:cNvPr>
+            <p:cNvSpPr txBox="1"/>
+            <p:nvPr/>
+          </p:nvSpPr>
+          <p:spPr>
+            <a:xfrm>
+              <a:off x="3930172" y="1971516"/>
+              <a:ext cx="1028700" cy="276999"/>
+            </a:xfrm>
+            <a:prstGeom prst="rect">
+              <a:avLst/>
+            </a:prstGeom>
+            <a:noFill/>
+            <a:ln>
+              <a:noFill/>
+            </a:ln>
+          </p:spPr>
+          <p:txBody>
+            <a:bodyPr wrap="square" rtlCol="0">
+              <a:spAutoFit/>
+            </a:bodyPr>
+            <a:lstStyle/>
+            <a:p>
+              <a:pPr algn="ctr"/>
+              <a:r>
+                <a:rPr lang="en-SG" sz="1200" b="1" dirty="0"/>
+                <a:t>Remote</a:t>
+              </a:r>
+              <a:endParaRPr lang="en-SG" sz="1100" b="1" dirty="0"/>
+            </a:p>
+          </p:txBody>
+        </p:sp>
+        <p:pic>
+          <p:nvPicPr>
+            <p:cNvPr id="10" name="Graphic 9" descr="Badge Cross outline">
+              <a:extLst>
+                <a:ext uri="{FF2B5EF4-FFF2-40B4-BE49-F238E27FC236}">
+                  <a16:creationId xmlns:a16="http://schemas.microsoft.com/office/drawing/2014/main" id="{1035F922-1042-2BD1-7526-DE6D6AE75BD4}"/>
+                </a:ext>
+              </a:extLst>
+            </p:cNvPr>
+            <p:cNvPicPr>
+              <a:picLocks/>
+            </p:cNvPicPr>
+            <p:nvPr/>
+          </p:nvPicPr>
+          <p:blipFill>
+            <a:blip r:embed="rId6">
+              <a:extLst>
+                <a:ext uri="{28A0092B-C50C-407E-A947-70E740481C1C}">
+                  <a14:useLocalDpi xmlns:a14="http://schemas.microsoft.com/office/drawing/2010/main" val="0"/>
+                </a:ext>
+                <a:ext uri="{96DAC541-7B7A-43D3-8B79-37D633B846F1}">
+                  <asvg:svgBlip xmlns:asvg="http://schemas.microsoft.com/office/drawing/2016/SVG/main" r:embed="rId7"/>
+                </a:ext>
+              </a:extLst>
+            </a:blip>
+            <a:stretch>
+              <a:fillRect/>
+            </a:stretch>
+          </p:blipFill>
+          <p:spPr>
+            <a:xfrm>
+              <a:off x="3382678" y="1476185"/>
+              <a:ext cx="370800" cy="370800"/>
+            </a:xfrm>
+            <a:prstGeom prst="rect">
+              <a:avLst/>
+            </a:prstGeom>
+          </p:spPr>
+        </p:pic>
+        <p:sp>
+          <p:nvSpPr>
+            <p:cNvPr id="11" name="TextBox 10">
+              <a:extLst>
+                <a:ext uri="{FF2B5EF4-FFF2-40B4-BE49-F238E27FC236}">
+                  <a16:creationId xmlns:a16="http://schemas.microsoft.com/office/drawing/2014/main" id="{7BDFFEAA-8ACA-5ABB-7AB3-255C35514ED9}"/>
+                </a:ext>
+              </a:extLst>
+            </p:cNvPr>
+            <p:cNvSpPr txBox="1"/>
+            <p:nvPr/>
+          </p:nvSpPr>
+          <p:spPr>
+            <a:xfrm>
+              <a:off x="3528165" y="1511006"/>
+              <a:ext cx="1028700" cy="276999"/>
+            </a:xfrm>
+            <a:prstGeom prst="rect">
+              <a:avLst/>
+            </a:prstGeom>
+            <a:noFill/>
+            <a:ln>
+              <a:noFill/>
+            </a:ln>
+          </p:spPr>
+          <p:txBody>
+            <a:bodyPr wrap="square" rtlCol="0">
+              <a:spAutoFit/>
+            </a:bodyPr>
+            <a:lstStyle/>
+            <a:p>
+              <a:pPr algn="ctr"/>
+              <a:r>
+                <a:rPr lang="en-SG" sz="1200" b="1" dirty="0"/>
+                <a:t>OR</a:t>
               </a:r>
               <a:endParaRPr lang="en-SG" sz="1100" b="1" dirty="0"/>
             </a:p>
@@ -3714,10 +3892,13 @@
         <p:grpSpPr>
           <a:xfrm>
             <a:off x="2224454" y="826476"/>
-            <a:ext cx="2778370" cy="1349555"/>
+            <a:ext cx="2778370" cy="1318847"/>
             <a:chOff x="2224454" y="826476"/>
-            <a:chExt cx="2778370" cy="1349555"/>
+            <a:chExt cx="2778370" cy="1318847"/>
           </a:xfrm>
+          <a:solidFill>
+            <a:srgbClr val="A5A69C"/>
+          </a:solidFill>
         </p:grpSpPr>
         <p:grpSp>
           <p:nvGrpSpPr>
@@ -3734,10 +3915,11 @@
           <p:grpSpPr>
             <a:xfrm>
               <a:off x="2224454" y="826476"/>
-              <a:ext cx="2778370" cy="1349555"/>
+              <a:ext cx="2778370" cy="1318847"/>
               <a:chOff x="2224454" y="826476"/>
-              <a:chExt cx="2778370" cy="1349555"/>
+              <a:chExt cx="2778370" cy="1318847"/>
             </a:xfrm>
+            <a:grpFill/>
           </p:grpSpPr>
           <p:sp>
             <p:nvSpPr>
@@ -3759,6 +3941,10 @@
               <a:prstGeom prst="ellipse">
                 <a:avLst/>
               </a:prstGeom>
+              <a:noFill/>
+              <a:ln>
+                <a:noFill/>
+              </a:ln>
             </p:spPr>
             <p:style>
               <a:lnRef idx="2">
@@ -3799,13 +3985,16 @@
             </p:nvSpPr>
             <p:spPr>
               <a:xfrm>
-                <a:off x="3103686" y="1899032"/>
+                <a:off x="3103686" y="1771551"/>
                 <a:ext cx="1028700" cy="276999"/>
               </a:xfrm>
               <a:prstGeom prst="rect">
                 <a:avLst/>
               </a:prstGeom>
               <a:noFill/>
+              <a:ln>
+                <a:noFill/>
+              </a:ln>
             </p:spPr>
             <p:txBody>
               <a:bodyPr wrap="square" rtlCol="0">
@@ -3854,7 +4043,7 @@
           </p:blipFill>
           <p:spPr>
             <a:xfrm>
-              <a:off x="3156439" y="984632"/>
+              <a:off x="3156439" y="960143"/>
               <a:ext cx="914400" cy="914400"/>
             </a:xfrm>
             <a:prstGeom prst="rect">
@@ -3908,10 +4097,13 @@
         <p:grpSpPr>
           <a:xfrm>
             <a:off x="1899139" y="1002322"/>
-            <a:ext cx="2778370" cy="1349555"/>
+            <a:ext cx="2778370" cy="1318847"/>
             <a:chOff x="2224454" y="852853"/>
-            <a:chExt cx="2778370" cy="1349555"/>
+            <a:chExt cx="2778370" cy="1318847"/>
           </a:xfrm>
+          <a:solidFill>
+            <a:srgbClr val="4A4F59"/>
+          </a:solidFill>
         </p:grpSpPr>
         <p:grpSp>
           <p:nvGrpSpPr>
@@ -3928,10 +4120,11 @@
           <p:grpSpPr>
             <a:xfrm>
               <a:off x="2224454" y="852853"/>
-              <a:ext cx="2778370" cy="1349555"/>
+              <a:ext cx="2778370" cy="1318847"/>
               <a:chOff x="2224454" y="826476"/>
-              <a:chExt cx="2778370" cy="1349555"/>
+              <a:chExt cx="2778370" cy="1318847"/>
             </a:xfrm>
+            <a:grpFill/>
           </p:grpSpPr>
           <p:sp>
             <p:nvSpPr>
@@ -3953,6 +4146,10 @@
               <a:prstGeom prst="ellipse">
                 <a:avLst/>
               </a:prstGeom>
+              <a:grpFill/>
+              <a:ln>
+                <a:noFill/>
+              </a:ln>
             </p:spPr>
             <p:style>
               <a:lnRef idx="2">
@@ -3993,13 +4190,13 @@
             </p:nvSpPr>
             <p:spPr>
               <a:xfrm>
-                <a:off x="3103686" y="1899032"/>
+                <a:off x="3099289" y="1747120"/>
                 <a:ext cx="1028700" cy="276999"/>
               </a:xfrm>
               <a:prstGeom prst="rect">
                 <a:avLst/>
               </a:prstGeom>
-              <a:noFill/>
+              <a:grpFill/>
             </p:spPr>
             <p:txBody>
               <a:bodyPr wrap="square" rtlCol="0">
@@ -4047,7 +4244,7 @@
           </p:blipFill>
           <p:spPr>
             <a:xfrm>
-              <a:off x="3156439" y="1011009"/>
+              <a:off x="3156439" y="942504"/>
               <a:ext cx="914400" cy="914400"/>
             </a:xfrm>
             <a:prstGeom prst="rect">

</xml_diff>